<commit_message>
Added front page and DB schema to the PPT
</commit_message>
<xml_diff>
--- a/Themepark sample.pptx
+++ b/Themepark sample.pptx
@@ -5,7 +5,9 @@
     <p:sldMasterId id="2147483648" r:id="rId1"/>
   </p:sldMasterIdLst>
   <p:sldIdLst>
-    <p:sldId id="256" r:id="rId2"/>
+    <p:sldId id="258" r:id="rId2"/>
+    <p:sldId id="256" r:id="rId3"/>
+    <p:sldId id="257" r:id="rId4"/>
   </p:sldIdLst>
   <p:sldSz cx="12192000" cy="6858000"/>
   <p:notesSz cx="6858000" cy="9144000"/>
@@ -261,7 +263,7 @@
           <a:p>
             <a:fld id="{639C5C35-4D10-4B81-A2B2-3672B162D0EF}" type="datetimeFigureOut">
               <a:rPr lang="en-IN" smtClean="0"/>
-              <a:t>13-12-2021</a:t>
+              <a:t>11-01-2022</a:t>
             </a:fld>
             <a:endParaRPr lang="en-IN"/>
           </a:p>
@@ -461,7 +463,7 @@
           <a:p>
             <a:fld id="{639C5C35-4D10-4B81-A2B2-3672B162D0EF}" type="datetimeFigureOut">
               <a:rPr lang="en-IN" smtClean="0"/>
-              <a:t>13-12-2021</a:t>
+              <a:t>11-01-2022</a:t>
             </a:fld>
             <a:endParaRPr lang="en-IN"/>
           </a:p>
@@ -671,7 +673,7 @@
           <a:p>
             <a:fld id="{639C5C35-4D10-4B81-A2B2-3672B162D0EF}" type="datetimeFigureOut">
               <a:rPr lang="en-IN" smtClean="0"/>
-              <a:t>13-12-2021</a:t>
+              <a:t>11-01-2022</a:t>
             </a:fld>
             <a:endParaRPr lang="en-IN"/>
           </a:p>
@@ -871,7 +873,7 @@
           <a:p>
             <a:fld id="{639C5C35-4D10-4B81-A2B2-3672B162D0EF}" type="datetimeFigureOut">
               <a:rPr lang="en-IN" smtClean="0"/>
-              <a:t>13-12-2021</a:t>
+              <a:t>11-01-2022</a:t>
             </a:fld>
             <a:endParaRPr lang="en-IN"/>
           </a:p>
@@ -1147,7 +1149,7 @@
           <a:p>
             <a:fld id="{639C5C35-4D10-4B81-A2B2-3672B162D0EF}" type="datetimeFigureOut">
               <a:rPr lang="en-IN" smtClean="0"/>
-              <a:t>13-12-2021</a:t>
+              <a:t>11-01-2022</a:t>
             </a:fld>
             <a:endParaRPr lang="en-IN"/>
           </a:p>
@@ -1415,7 +1417,7 @@
           <a:p>
             <a:fld id="{639C5C35-4D10-4B81-A2B2-3672B162D0EF}" type="datetimeFigureOut">
               <a:rPr lang="en-IN" smtClean="0"/>
-              <a:t>13-12-2021</a:t>
+              <a:t>11-01-2022</a:t>
             </a:fld>
             <a:endParaRPr lang="en-IN"/>
           </a:p>
@@ -1830,7 +1832,7 @@
           <a:p>
             <a:fld id="{639C5C35-4D10-4B81-A2B2-3672B162D0EF}" type="datetimeFigureOut">
               <a:rPr lang="en-IN" smtClean="0"/>
-              <a:t>13-12-2021</a:t>
+              <a:t>11-01-2022</a:t>
             </a:fld>
             <a:endParaRPr lang="en-IN"/>
           </a:p>
@@ -1972,7 +1974,7 @@
           <a:p>
             <a:fld id="{639C5C35-4D10-4B81-A2B2-3672B162D0EF}" type="datetimeFigureOut">
               <a:rPr lang="en-IN" smtClean="0"/>
-              <a:t>13-12-2021</a:t>
+              <a:t>11-01-2022</a:t>
             </a:fld>
             <a:endParaRPr lang="en-IN"/>
           </a:p>
@@ -2085,7 +2087,7 @@
           <a:p>
             <a:fld id="{639C5C35-4D10-4B81-A2B2-3672B162D0EF}" type="datetimeFigureOut">
               <a:rPr lang="en-IN" smtClean="0"/>
-              <a:t>13-12-2021</a:t>
+              <a:t>11-01-2022</a:t>
             </a:fld>
             <a:endParaRPr lang="en-IN"/>
           </a:p>
@@ -2398,7 +2400,7 @@
           <a:p>
             <a:fld id="{639C5C35-4D10-4B81-A2B2-3672B162D0EF}" type="datetimeFigureOut">
               <a:rPr lang="en-IN" smtClean="0"/>
-              <a:t>13-12-2021</a:t>
+              <a:t>11-01-2022</a:t>
             </a:fld>
             <a:endParaRPr lang="en-IN"/>
           </a:p>
@@ -2687,7 +2689,7 @@
           <a:p>
             <a:fld id="{639C5C35-4D10-4B81-A2B2-3672B162D0EF}" type="datetimeFigureOut">
               <a:rPr lang="en-IN" smtClean="0"/>
-              <a:t>13-12-2021</a:t>
+              <a:t>11-01-2022</a:t>
             </a:fld>
             <a:endParaRPr lang="en-IN"/>
           </a:p>
@@ -2930,7 +2932,7 @@
           <a:p>
             <a:fld id="{639C5C35-4D10-4B81-A2B2-3672B162D0EF}" type="datetimeFigureOut">
               <a:rPr lang="en-IN" smtClean="0"/>
-              <a:t>13-12-2021</a:t>
+              <a:t>11-01-2022</a:t>
             </a:fld>
             <a:endParaRPr lang="en-IN"/>
           </a:p>
@@ -3349,10 +3351,88 @@
       </p:grpSpPr>
       <p:sp>
         <p:nvSpPr>
+          <p:cNvPr id="4" name="TextBox 3">
+            <a:extLst>
+              <a:ext uri="{FF2B5EF4-FFF2-40B4-BE49-F238E27FC236}">
+                <a16:creationId xmlns:a16="http://schemas.microsoft.com/office/drawing/2014/main" id="{6CDA2C58-D14C-43E5-98DD-8CEC3FBE146D}"/>
+              </a:ext>
+            </a:extLst>
+          </p:cNvPr>
+          <p:cNvSpPr txBox="1"/>
+          <p:nvPr/>
+        </p:nvSpPr>
+        <p:spPr>
+          <a:xfrm>
+            <a:off x="7537143" y="4190260"/>
+            <a:ext cx="4447712" cy="2031325"/>
+          </a:xfrm>
+          <a:prstGeom prst="rect">
+            <a:avLst/>
+          </a:prstGeom>
+          <a:noFill/>
+        </p:spPr>
+        <p:txBody>
+          <a:bodyPr wrap="square" rtlCol="0">
+            <a:spAutoFit/>
+          </a:bodyPr>
+          <a:lstStyle/>
+          <a:p>
+            <a:r>
+              <a:rPr lang="en-US" b="1" dirty="0"/>
+              <a:t>By Team 2</a:t>
+            </a:r>
+            <a:r>
+              <a:rPr lang="en-US" dirty="0"/>
+              <a:t>:</a:t>
+            </a:r>
+          </a:p>
+          <a:p>
+            <a:r>
+              <a:rPr lang="en-US" dirty="0"/>
+              <a:t>	Anup Jacob</a:t>
+            </a:r>
+          </a:p>
+          <a:p>
+            <a:r>
+              <a:rPr lang="en-US" dirty="0"/>
+              <a:t>	Muhammed Shafeeq Thottathil</a:t>
+            </a:r>
+          </a:p>
+          <a:p>
+            <a:r>
+              <a:rPr lang="en-US" dirty="0"/>
+              <a:t>	Sreejith </a:t>
+            </a:r>
+            <a:r>
+              <a:rPr lang="en-US" dirty="0" err="1"/>
+              <a:t>Purushothaman</a:t>
+            </a:r>
+            <a:r>
+              <a:rPr lang="en-US" dirty="0"/>
+              <a:t>	Snehal Khairnar</a:t>
+            </a:r>
+          </a:p>
+          <a:p>
+            <a:r>
+              <a:rPr lang="en-US" dirty="0"/>
+              <a:t>	Snehal</a:t>
+            </a:r>
+          </a:p>
+          <a:p>
+            <a:r>
+              <a:rPr lang="en-US" dirty="0"/>
+              <a:t>	Varnit Rohilla</a:t>
+            </a:r>
+            <a:endParaRPr lang="en-IN" dirty="0"/>
+          </a:p>
+        </p:txBody>
+      </p:sp>
+      <p:sp>
+        <p:nvSpPr>
           <p:cNvPr id="5" name="Rectangle 4">
             <a:extLst>
               <a:ext uri="{FF2B5EF4-FFF2-40B4-BE49-F238E27FC236}">
-                <a16:creationId xmlns:a16="http://schemas.microsoft.com/office/drawing/2014/main" id="{11AEB1A3-E4EC-4CE7-9895-3B49807CB55B}"/>
+                <a16:creationId xmlns:a16="http://schemas.microsoft.com/office/drawing/2014/main" id="{B0D9B018-7250-4EA5-8DC7-F60EE1824B62}"/>
               </a:ext>
             </a:extLst>
           </p:cNvPr>
@@ -3361,7 +3441,122 @@
         </p:nvSpPr>
         <p:spPr>
           <a:xfrm>
-            <a:off x="2663302" y="266330"/>
+            <a:off x="2881241" y="2567840"/>
+            <a:ext cx="6429517" cy="923330"/>
+          </a:xfrm>
+          <a:prstGeom prst="rect">
+            <a:avLst/>
+          </a:prstGeom>
+          <a:noFill/>
+        </p:spPr>
+        <p:txBody>
+          <a:bodyPr wrap="none" lIns="91440" tIns="45720" rIns="91440" bIns="45720">
+            <a:spAutoFit/>
+          </a:bodyPr>
+          <a:lstStyle/>
+          <a:p>
+            <a:pPr algn="ctr"/>
+            <a:r>
+              <a:rPr lang="en-US" sz="5400" b="0" cap="none" spc="0" dirty="0">
+                <a:ln w="0"/>
+                <a:gradFill>
+                  <a:gsLst>
+                    <a:gs pos="0">
+                      <a:schemeClr val="accent5">
+                        <a:lumMod val="50000"/>
+                      </a:schemeClr>
+                    </a:gs>
+                    <a:gs pos="50000">
+                      <a:schemeClr val="accent5"/>
+                    </a:gs>
+                    <a:gs pos="100000">
+                      <a:schemeClr val="accent5">
+                        <a:lumMod val="60000"/>
+                        <a:lumOff val="40000"/>
+                      </a:schemeClr>
+                    </a:gs>
+                  </a:gsLst>
+                  <a:lin ang="5400000"/>
+                </a:gradFill>
+                <a:effectLst>
+                  <a:reflection blurRad="6350" stA="53000" endA="300" endPos="35500" dir="5400000" sy="-90000" algn="bl" rotWithShape="0"/>
+                </a:effectLst>
+              </a:rPr>
+              <a:t>WICKED ADVENTURES</a:t>
+            </a:r>
+            <a:endParaRPr lang="en-IN" sz="5400" b="0" cap="none" spc="0" dirty="0">
+              <a:ln w="0"/>
+              <a:gradFill>
+                <a:gsLst>
+                  <a:gs pos="0">
+                    <a:schemeClr val="accent5">
+                      <a:lumMod val="50000"/>
+                    </a:schemeClr>
+                  </a:gs>
+                  <a:gs pos="50000">
+                    <a:schemeClr val="accent5"/>
+                  </a:gs>
+                  <a:gs pos="100000">
+                    <a:schemeClr val="accent5">
+                      <a:lumMod val="60000"/>
+                      <a:lumOff val="40000"/>
+                    </a:schemeClr>
+                  </a:gs>
+                </a:gsLst>
+                <a:lin ang="5400000"/>
+              </a:gradFill>
+              <a:effectLst>
+                <a:reflection blurRad="6350" stA="53000" endA="300" endPos="35500" dir="5400000" sy="-90000" algn="bl" rotWithShape="0"/>
+              </a:effectLst>
+            </a:endParaRPr>
+          </a:p>
+        </p:txBody>
+      </p:sp>
+    </p:spTree>
+    <p:extLst>
+      <p:ext uri="{BB962C8B-B14F-4D97-AF65-F5344CB8AC3E}">
+        <p14:creationId xmlns:p14="http://schemas.microsoft.com/office/powerpoint/2010/main" val="1300978019"/>
+      </p:ext>
+    </p:extLst>
+  </p:cSld>
+  <p:clrMapOvr>
+    <a:masterClrMapping/>
+  </p:clrMapOvr>
+</p:sld>
+</file>
+
+<file path=ppt/slides/slide2.xml><?xml version="1.0" encoding="utf-8"?>
+<p:sld xmlns:a="http://schemas.openxmlformats.org/drawingml/2006/main" xmlns:r="http://schemas.openxmlformats.org/officeDocument/2006/relationships" xmlns:p="http://schemas.openxmlformats.org/presentationml/2006/main">
+  <p:cSld>
+    <p:spTree>
+      <p:nvGrpSpPr>
+        <p:cNvPr id="1" name=""/>
+        <p:cNvGrpSpPr/>
+        <p:nvPr/>
+      </p:nvGrpSpPr>
+      <p:grpSpPr>
+        <a:xfrm>
+          <a:off x="0" y="0"/>
+          <a:ext cx="0" cy="0"/>
+          <a:chOff x="0" y="0"/>
+          <a:chExt cx="0" cy="0"/>
+        </a:xfrm>
+      </p:grpSpPr>
+      <p:sp>
+        <p:nvSpPr>
+          <p:cNvPr id="5" name="Rectangle 4">
+            <a:extLst>
+              <a:ext uri="{FF2B5EF4-FFF2-40B4-BE49-F238E27FC236}">
+                <a16:creationId xmlns:a16="http://schemas.microsoft.com/office/drawing/2014/main" id="{11AEB1A3-E4EC-4CE7-9895-3B49807CB55B}"/>
+              </a:ext>
+            </a:extLst>
+          </p:cNvPr>
+          <p:cNvSpPr/>
+          <p:nvPr/>
+        </p:nvSpPr>
+        <p:spPr>
+          <a:xfrm>
+            <a:off x="2698812" y="1438183"/>
             <a:ext cx="6844684" cy="1065320"/>
           </a:xfrm>
           <a:prstGeom prst="rect">
@@ -3407,7 +3602,7 @@
         </p:nvSpPr>
         <p:spPr>
           <a:xfrm>
-            <a:off x="2943225" y="647700"/>
+            <a:off x="2978735" y="1819553"/>
             <a:ext cx="6172200" cy="369332"/>
           </a:xfrm>
           <a:prstGeom prst="rect">
@@ -3452,7 +3647,7 @@
         </p:nvSpPr>
         <p:spPr>
           <a:xfrm>
-            <a:off x="152399" y="1713020"/>
+            <a:off x="187909" y="2884873"/>
             <a:ext cx="2173551" cy="1065320"/>
           </a:xfrm>
           <a:prstGeom prst="rect">
@@ -3498,7 +3693,7 @@
         </p:nvSpPr>
         <p:spPr>
           <a:xfrm>
-            <a:off x="2557491" y="1713020"/>
+            <a:off x="2593001" y="2884873"/>
             <a:ext cx="2173551" cy="1065320"/>
           </a:xfrm>
           <a:prstGeom prst="rect">
@@ -3544,7 +3739,7 @@
         </p:nvSpPr>
         <p:spPr>
           <a:xfrm>
-            <a:off x="4995158" y="1713020"/>
+            <a:off x="5030668" y="2884873"/>
             <a:ext cx="2173551" cy="1065320"/>
           </a:xfrm>
           <a:prstGeom prst="rect">
@@ -3590,7 +3785,7 @@
         </p:nvSpPr>
         <p:spPr>
           <a:xfrm>
-            <a:off x="7430604" y="1713020"/>
+            <a:off x="7466114" y="2884873"/>
             <a:ext cx="2173551" cy="1065320"/>
           </a:xfrm>
           <a:prstGeom prst="rect">
@@ -3636,7 +3831,7 @@
         </p:nvSpPr>
         <p:spPr>
           <a:xfrm>
-            <a:off x="9866050" y="1713020"/>
+            <a:off x="9901560" y="2884873"/>
             <a:ext cx="2173551" cy="1065320"/>
           </a:xfrm>
           <a:prstGeom prst="rect">
@@ -3682,7 +3877,7 @@
         </p:nvSpPr>
         <p:spPr>
           <a:xfrm>
-            <a:off x="523783" y="1970843"/>
+            <a:off x="559293" y="3142696"/>
             <a:ext cx="1526959" cy="646331"/>
           </a:xfrm>
           <a:prstGeom prst="rect">
@@ -3727,7 +3922,7 @@
         </p:nvSpPr>
         <p:spPr>
           <a:xfrm>
-            <a:off x="1012054" y="3213717"/>
+            <a:off x="1047564" y="4385570"/>
             <a:ext cx="1313896" cy="646331"/>
           </a:xfrm>
           <a:prstGeom prst="rect">
@@ -3763,7 +3958,7 @@
         </p:nvSpPr>
         <p:spPr>
           <a:xfrm>
-            <a:off x="3417146" y="3213717"/>
+            <a:off x="3452656" y="4385570"/>
             <a:ext cx="1313896" cy="646331"/>
           </a:xfrm>
           <a:prstGeom prst="rect">
@@ -3799,7 +3994,7 @@
         </p:nvSpPr>
         <p:spPr>
           <a:xfrm>
-            <a:off x="5854813" y="3168588"/>
+            <a:off x="5890323" y="4340441"/>
             <a:ext cx="1313896" cy="646331"/>
           </a:xfrm>
           <a:prstGeom prst="rect">
@@ -3835,7 +4030,7 @@
         </p:nvSpPr>
         <p:spPr>
           <a:xfrm>
-            <a:off x="10725705" y="3168588"/>
+            <a:off x="10761215" y="4340441"/>
             <a:ext cx="1313896" cy="646331"/>
           </a:xfrm>
           <a:prstGeom prst="rect">
@@ -3871,7 +4066,7 @@
         </p:nvSpPr>
         <p:spPr>
           <a:xfrm>
-            <a:off x="8290259" y="3168588"/>
+            <a:off x="8325769" y="4340441"/>
             <a:ext cx="1313896" cy="646331"/>
           </a:xfrm>
           <a:prstGeom prst="rect">
@@ -3907,7 +4102,7 @@
         </p:nvSpPr>
         <p:spPr>
           <a:xfrm>
-            <a:off x="182370" y="3302409"/>
+            <a:off x="217880" y="4474262"/>
             <a:ext cx="284086" cy="253182"/>
           </a:xfrm>
           <a:prstGeom prst="rect">
@@ -3956,7 +4151,7 @@
         </p:nvSpPr>
         <p:spPr>
           <a:xfrm>
-            <a:off x="2571175" y="3284505"/>
+            <a:off x="2606685" y="4456358"/>
             <a:ext cx="284086" cy="253182"/>
           </a:xfrm>
           <a:prstGeom prst="rect">
@@ -4005,7 +4200,7 @@
         </p:nvSpPr>
         <p:spPr>
           <a:xfrm>
-            <a:off x="5039195" y="3302409"/>
+            <a:off x="5074705" y="4474262"/>
             <a:ext cx="284086" cy="253182"/>
           </a:xfrm>
           <a:prstGeom prst="rect">
@@ -4054,7 +4249,7 @@
         </p:nvSpPr>
         <p:spPr>
           <a:xfrm>
-            <a:off x="7460960" y="3311202"/>
+            <a:off x="7496470" y="4483055"/>
             <a:ext cx="284086" cy="253182"/>
           </a:xfrm>
           <a:prstGeom prst="rect">
@@ -4103,7 +4298,7 @@
         </p:nvSpPr>
         <p:spPr>
           <a:xfrm>
-            <a:off x="9914873" y="3302409"/>
+            <a:off x="9950383" y="4474262"/>
             <a:ext cx="284086" cy="253182"/>
           </a:xfrm>
           <a:prstGeom prst="rect">
@@ -4156,7 +4351,7 @@
         </p:nvCxnSpPr>
         <p:spPr>
           <a:xfrm rot="5400000">
-            <a:off x="4674271" y="301647"/>
+            <a:off x="4709781" y="1473500"/>
             <a:ext cx="381370" cy="2441377"/>
           </a:xfrm>
           <a:prstGeom prst="bentConnector3">
@@ -4201,7 +4396,7 @@
         </p:nvCxnSpPr>
         <p:spPr>
           <a:xfrm rot="5400000">
-            <a:off x="5893104" y="1520480"/>
+            <a:off x="5928614" y="2692333"/>
             <a:ext cx="381370" cy="3710"/>
           </a:xfrm>
           <a:prstGeom prst="bentConnector3">
@@ -4246,7 +4441,7 @@
         </p:nvCxnSpPr>
         <p:spPr>
           <a:xfrm rot="5400000">
-            <a:off x="3471725" y="-900899"/>
+            <a:off x="3507235" y="270954"/>
             <a:ext cx="381370" cy="4846469"/>
           </a:xfrm>
           <a:prstGeom prst="bentConnector3">
@@ -4291,7 +4486,7 @@
         </p:nvCxnSpPr>
         <p:spPr>
           <a:xfrm rot="16200000" flipH="1">
-            <a:off x="7110827" y="306467"/>
+            <a:off x="7146337" y="1478320"/>
             <a:ext cx="381370" cy="2431736"/>
           </a:xfrm>
           <a:prstGeom prst="bentConnector3">
@@ -4336,7 +4531,7 @@
         </p:nvCxnSpPr>
         <p:spPr>
           <a:xfrm rot="16200000" flipH="1">
-            <a:off x="8328550" y="-911256"/>
+            <a:off x="8364060" y="260597"/>
             <a:ext cx="381370" cy="4867182"/>
           </a:xfrm>
           <a:prstGeom prst="bentConnector3">
@@ -4377,7 +4572,7 @@
         </p:nvSpPr>
         <p:spPr>
           <a:xfrm>
-            <a:off x="2855261" y="1961244"/>
+            <a:off x="2890771" y="3133097"/>
             <a:ext cx="1526959" cy="369332"/>
           </a:xfrm>
           <a:prstGeom prst="rect">
@@ -4422,7 +4617,7 @@
         </p:nvSpPr>
         <p:spPr>
           <a:xfrm>
-            <a:off x="5265845" y="1909670"/>
+            <a:off x="5301355" y="3081523"/>
             <a:ext cx="1526959" cy="369332"/>
           </a:xfrm>
           <a:prstGeom prst="rect">
@@ -4467,7 +4662,7 @@
         </p:nvSpPr>
         <p:spPr>
           <a:xfrm>
-            <a:off x="7745046" y="1822744"/>
+            <a:off x="7780556" y="2994597"/>
             <a:ext cx="1526959" cy="646331"/>
           </a:xfrm>
           <a:prstGeom prst="rect">
@@ -4512,7 +4707,7 @@
         </p:nvSpPr>
         <p:spPr>
           <a:xfrm>
-            <a:off x="10198959" y="1919232"/>
+            <a:off x="10234469" y="3091085"/>
             <a:ext cx="1526959" cy="369332"/>
           </a:xfrm>
           <a:prstGeom prst="rect">
@@ -4557,7 +4752,7 @@
         </p:nvSpPr>
         <p:spPr>
           <a:xfrm>
-            <a:off x="8290259" y="4785064"/>
+            <a:off x="8325769" y="5956917"/>
             <a:ext cx="1575791" cy="741286"/>
           </a:xfrm>
           <a:prstGeom prst="rect">
@@ -4603,7 +4798,7 @@
         </p:nvSpPr>
         <p:spPr>
           <a:xfrm>
-            <a:off x="8671406" y="4971041"/>
+            <a:off x="8706916" y="6142894"/>
             <a:ext cx="932749" cy="369332"/>
           </a:xfrm>
           <a:prstGeom prst="rect">
@@ -4633,10 +4828,974 @@
           </a:p>
         </p:txBody>
       </p:sp>
+      <p:sp>
+        <p:nvSpPr>
+          <p:cNvPr id="31" name="Title 1">
+            <a:extLst>
+              <a:ext uri="{FF2B5EF4-FFF2-40B4-BE49-F238E27FC236}">
+                <a16:creationId xmlns:a16="http://schemas.microsoft.com/office/drawing/2014/main" id="{931CBA16-F3EB-4321-8A0D-6790CF236513}"/>
+              </a:ext>
+            </a:extLst>
+          </p:cNvPr>
+          <p:cNvSpPr txBox="1">
+            <a:spLocks/>
+          </p:cNvSpPr>
+          <p:nvPr/>
+        </p:nvSpPr>
+        <p:spPr>
+          <a:xfrm>
+            <a:off x="838200" y="365125"/>
+            <a:ext cx="10515600" cy="887081"/>
+          </a:xfrm>
+          <a:prstGeom prst="rect">
+            <a:avLst/>
+          </a:prstGeom>
+        </p:spPr>
+        <p:txBody>
+          <a:bodyPr vert="horz" lIns="91440" tIns="45720" rIns="91440" bIns="45720" rtlCol="0" anchor="b">
+            <a:normAutofit lnSpcReduction="10000"/>
+          </a:bodyPr>
+          <a:lstStyle>
+            <a:lvl1pPr algn="ctr" defTabSz="914400" rtl="0" eaLnBrk="1" latinLnBrk="0" hangingPunct="1">
+              <a:lnSpc>
+                <a:spcPct val="90000"/>
+              </a:lnSpc>
+              <a:spcBef>
+                <a:spcPct val="0"/>
+              </a:spcBef>
+              <a:buNone/>
+              <a:defRPr sz="6000" kern="1200">
+                <a:solidFill>
+                  <a:schemeClr val="tx1"/>
+                </a:solidFill>
+                <a:latin typeface="+mj-lt"/>
+                <a:ea typeface="+mj-ea"/>
+                <a:cs typeface="+mj-cs"/>
+              </a:defRPr>
+            </a:lvl1pPr>
+          </a:lstStyle>
+          <a:p>
+            <a:r>
+              <a:rPr lang="en-US" b="1" dirty="0"/>
+              <a:t>Functionality</a:t>
+            </a:r>
+            <a:endParaRPr lang="en-IN" b="1" dirty="0"/>
+          </a:p>
+        </p:txBody>
+      </p:sp>
     </p:spTree>
     <p:extLst>
       <p:ext uri="{BB962C8B-B14F-4D97-AF65-F5344CB8AC3E}">
         <p14:creationId xmlns:p14="http://schemas.microsoft.com/office/powerpoint/2010/main" val="2696722571"/>
+      </p:ext>
+    </p:extLst>
+  </p:cSld>
+  <p:clrMapOvr>
+    <a:masterClrMapping/>
+  </p:clrMapOvr>
+</p:sld>
+</file>
+
+<file path=ppt/slides/slide3.xml><?xml version="1.0" encoding="utf-8"?>
+<p:sld xmlns:a="http://schemas.openxmlformats.org/drawingml/2006/main" xmlns:r="http://schemas.openxmlformats.org/officeDocument/2006/relationships" xmlns:p="http://schemas.openxmlformats.org/presentationml/2006/main">
+  <p:cSld>
+    <p:spTree>
+      <p:nvGrpSpPr>
+        <p:cNvPr id="1" name=""/>
+        <p:cNvGrpSpPr/>
+        <p:nvPr/>
+      </p:nvGrpSpPr>
+      <p:grpSpPr>
+        <a:xfrm>
+          <a:off x="0" y="0"/>
+          <a:ext cx="0" cy="0"/>
+          <a:chOff x="0" y="0"/>
+          <a:chExt cx="0" cy="0"/>
+        </a:xfrm>
+      </p:grpSpPr>
+      <p:sp>
+        <p:nvSpPr>
+          <p:cNvPr id="2" name="Title 1">
+            <a:extLst>
+              <a:ext uri="{FF2B5EF4-FFF2-40B4-BE49-F238E27FC236}">
+                <a16:creationId xmlns:a16="http://schemas.microsoft.com/office/drawing/2014/main" id="{C22822AD-B726-48E2-80B4-C185F6AC4160}"/>
+              </a:ext>
+            </a:extLst>
+          </p:cNvPr>
+          <p:cNvSpPr>
+            <a:spLocks noGrp="1"/>
+          </p:cNvSpPr>
+          <p:nvPr>
+            <p:ph type="title"/>
+          </p:nvPr>
+        </p:nvSpPr>
+        <p:spPr/>
+        <p:txBody>
+          <a:bodyPr/>
+          <a:lstStyle/>
+          <a:p>
+            <a:pPr algn="ctr"/>
+            <a:r>
+              <a:rPr lang="en-US" b="1" dirty="0"/>
+              <a:t>Database Schema</a:t>
+            </a:r>
+            <a:endParaRPr lang="en-IN" b="1" dirty="0"/>
+          </a:p>
+        </p:txBody>
+      </p:sp>
+      <p:graphicFrame>
+        <p:nvGraphicFramePr>
+          <p:cNvPr id="4" name="Table 4">
+            <a:extLst>
+              <a:ext uri="{FF2B5EF4-FFF2-40B4-BE49-F238E27FC236}">
+                <a16:creationId xmlns:a16="http://schemas.microsoft.com/office/drawing/2014/main" id="{D3D72F89-CE69-4E63-9DBA-F06D538DAD72}"/>
+              </a:ext>
+            </a:extLst>
+          </p:cNvPr>
+          <p:cNvGraphicFramePr>
+            <a:graphicFrameLocks noGrp="1"/>
+          </p:cNvGraphicFramePr>
+          <p:nvPr>
+            <p:ph idx="1"/>
+            <p:extLst>
+              <p:ext uri="{D42A27DB-BD31-4B8C-83A1-F6EECF244321}">
+                <p14:modId xmlns:p14="http://schemas.microsoft.com/office/powerpoint/2010/main" val="1712815406"/>
+              </p:ext>
+            </p:extLst>
+          </p:nvPr>
+        </p:nvGraphicFramePr>
+        <p:xfrm>
+          <a:off x="838200" y="1825625"/>
+          <a:ext cx="10515600" cy="1112520"/>
+        </p:xfrm>
+        <a:graphic>
+          <a:graphicData uri="http://schemas.openxmlformats.org/drawingml/2006/table">
+            <a:tbl>
+              <a:tblPr firstRow="1" bandRow="1">
+                <a:tableStyleId>{5C22544A-7EE6-4342-B048-85BDC9FD1C3A}</a:tableStyleId>
+              </a:tblPr>
+              <a:tblGrid>
+                <a:gridCol w="1752600">
+                  <a:extLst>
+                    <a:ext uri="{9D8B030D-6E8A-4147-A177-3AD203B41FA5}">
+                      <a16:colId xmlns:a16="http://schemas.microsoft.com/office/drawing/2014/main" val="1277939613"/>
+                    </a:ext>
+                  </a:extLst>
+                </a:gridCol>
+                <a:gridCol w="1752600">
+                  <a:extLst>
+                    <a:ext uri="{9D8B030D-6E8A-4147-A177-3AD203B41FA5}">
+                      <a16:colId xmlns:a16="http://schemas.microsoft.com/office/drawing/2014/main" val="4154575395"/>
+                    </a:ext>
+                  </a:extLst>
+                </a:gridCol>
+                <a:gridCol w="1752600">
+                  <a:extLst>
+                    <a:ext uri="{9D8B030D-6E8A-4147-A177-3AD203B41FA5}">
+                      <a16:colId xmlns:a16="http://schemas.microsoft.com/office/drawing/2014/main" val="1659421911"/>
+                    </a:ext>
+                  </a:extLst>
+                </a:gridCol>
+                <a:gridCol w="1752600">
+                  <a:extLst>
+                    <a:ext uri="{9D8B030D-6E8A-4147-A177-3AD203B41FA5}">
+                      <a16:colId xmlns:a16="http://schemas.microsoft.com/office/drawing/2014/main" val="333647600"/>
+                    </a:ext>
+                  </a:extLst>
+                </a:gridCol>
+                <a:gridCol w="1752600">
+                  <a:extLst>
+                    <a:ext uri="{9D8B030D-6E8A-4147-A177-3AD203B41FA5}">
+                      <a16:colId xmlns:a16="http://schemas.microsoft.com/office/drawing/2014/main" val="826640890"/>
+                    </a:ext>
+                  </a:extLst>
+                </a:gridCol>
+                <a:gridCol w="1752600">
+                  <a:extLst>
+                    <a:ext uri="{9D8B030D-6E8A-4147-A177-3AD203B41FA5}">
+                      <a16:colId xmlns:a16="http://schemas.microsoft.com/office/drawing/2014/main" val="1070321062"/>
+                    </a:ext>
+                  </a:extLst>
+                </a:gridCol>
+              </a:tblGrid>
+              <a:tr h="370840">
+                <a:tc>
+                  <a:txBody>
+                    <a:bodyPr/>
+                    <a:lstStyle/>
+                    <a:p>
+                      <a:r>
+                        <a:rPr lang="en-US" dirty="0"/>
+                        <a:t>Ride Number</a:t>
+                      </a:r>
+                      <a:endParaRPr lang="en-IN" dirty="0"/>
+                    </a:p>
+                  </a:txBody>
+                  <a:tcPr/>
+                </a:tc>
+                <a:tc>
+                  <a:txBody>
+                    <a:bodyPr/>
+                    <a:lstStyle/>
+                    <a:p>
+                      <a:r>
+                        <a:rPr lang="en-US" dirty="0"/>
+                        <a:t>Ride Name</a:t>
+                      </a:r>
+                      <a:endParaRPr lang="en-IN" dirty="0"/>
+                    </a:p>
+                  </a:txBody>
+                  <a:tcPr/>
+                </a:tc>
+                <a:tc>
+                  <a:txBody>
+                    <a:bodyPr/>
+                    <a:lstStyle/>
+                    <a:p>
+                      <a:r>
+                        <a:rPr lang="en-US" dirty="0"/>
+                        <a:t>Health </a:t>
+                      </a:r>
+                      <a:r>
+                        <a:rPr lang="en-US" dirty="0" err="1"/>
+                        <a:t>Secuity</a:t>
+                      </a:r>
+                      <a:endParaRPr lang="en-IN" dirty="0"/>
+                    </a:p>
+                  </a:txBody>
+                  <a:tcPr/>
+                </a:tc>
+                <a:tc>
+                  <a:txBody>
+                    <a:bodyPr/>
+                    <a:lstStyle/>
+                    <a:p>
+                      <a:r>
+                        <a:rPr lang="en-US" dirty="0"/>
+                        <a:t>Status</a:t>
+                      </a:r>
+                      <a:endParaRPr lang="en-IN" dirty="0"/>
+                    </a:p>
+                  </a:txBody>
+                  <a:tcPr/>
+                </a:tc>
+                <a:tc>
+                  <a:txBody>
+                    <a:bodyPr/>
+                    <a:lstStyle/>
+                    <a:p>
+                      <a:r>
+                        <a:rPr lang="en-US" dirty="0"/>
+                        <a:t>Cost</a:t>
+                      </a:r>
+                      <a:endParaRPr lang="en-IN" dirty="0"/>
+                    </a:p>
+                  </a:txBody>
+                  <a:tcPr/>
+                </a:tc>
+                <a:tc>
+                  <a:txBody>
+                    <a:bodyPr/>
+                    <a:lstStyle/>
+                    <a:p>
+                      <a:r>
+                        <a:rPr lang="en-US" dirty="0"/>
+                        <a:t>Changed Date</a:t>
+                      </a:r>
+                      <a:endParaRPr lang="en-IN" dirty="0"/>
+                    </a:p>
+                  </a:txBody>
+                  <a:tcPr/>
+                </a:tc>
+                <a:extLst>
+                  <a:ext uri="{0D108BD9-81ED-4DB2-BD59-A6C34878D82A}">
+                    <a16:rowId xmlns:a16="http://schemas.microsoft.com/office/drawing/2014/main" val="3839619964"/>
+                  </a:ext>
+                </a:extLst>
+              </a:tr>
+              <a:tr h="370840">
+                <a:tc>
+                  <a:txBody>
+                    <a:bodyPr/>
+                    <a:lstStyle/>
+                    <a:p>
+                      <a:endParaRPr lang="en-IN"/>
+                    </a:p>
+                  </a:txBody>
+                  <a:tcPr/>
+                </a:tc>
+                <a:tc>
+                  <a:txBody>
+                    <a:bodyPr/>
+                    <a:lstStyle/>
+                    <a:p>
+                      <a:endParaRPr lang="en-IN" dirty="0"/>
+                    </a:p>
+                  </a:txBody>
+                  <a:tcPr/>
+                </a:tc>
+                <a:tc>
+                  <a:txBody>
+                    <a:bodyPr/>
+                    <a:lstStyle/>
+                    <a:p>
+                      <a:endParaRPr lang="en-IN" dirty="0"/>
+                    </a:p>
+                  </a:txBody>
+                  <a:tcPr/>
+                </a:tc>
+                <a:tc>
+                  <a:txBody>
+                    <a:bodyPr/>
+                    <a:lstStyle/>
+                    <a:p>
+                      <a:endParaRPr lang="en-IN"/>
+                    </a:p>
+                  </a:txBody>
+                  <a:tcPr/>
+                </a:tc>
+                <a:tc>
+                  <a:txBody>
+                    <a:bodyPr/>
+                    <a:lstStyle/>
+                    <a:p>
+                      <a:endParaRPr lang="en-IN"/>
+                    </a:p>
+                  </a:txBody>
+                  <a:tcPr/>
+                </a:tc>
+                <a:tc>
+                  <a:txBody>
+                    <a:bodyPr/>
+                    <a:lstStyle/>
+                    <a:p>
+                      <a:endParaRPr lang="en-IN"/>
+                    </a:p>
+                  </a:txBody>
+                  <a:tcPr/>
+                </a:tc>
+                <a:extLst>
+                  <a:ext uri="{0D108BD9-81ED-4DB2-BD59-A6C34878D82A}">
+                    <a16:rowId xmlns:a16="http://schemas.microsoft.com/office/drawing/2014/main" val="167107663"/>
+                  </a:ext>
+                </a:extLst>
+              </a:tr>
+              <a:tr h="370840">
+                <a:tc>
+                  <a:txBody>
+                    <a:bodyPr/>
+                    <a:lstStyle/>
+                    <a:p>
+                      <a:endParaRPr lang="en-IN"/>
+                    </a:p>
+                  </a:txBody>
+                  <a:tcPr/>
+                </a:tc>
+                <a:tc>
+                  <a:txBody>
+                    <a:bodyPr/>
+                    <a:lstStyle/>
+                    <a:p>
+                      <a:endParaRPr lang="en-IN"/>
+                    </a:p>
+                  </a:txBody>
+                  <a:tcPr/>
+                </a:tc>
+                <a:tc>
+                  <a:txBody>
+                    <a:bodyPr/>
+                    <a:lstStyle/>
+                    <a:p>
+                      <a:endParaRPr lang="en-IN" dirty="0"/>
+                    </a:p>
+                  </a:txBody>
+                  <a:tcPr/>
+                </a:tc>
+                <a:tc>
+                  <a:txBody>
+                    <a:bodyPr/>
+                    <a:lstStyle/>
+                    <a:p>
+                      <a:endParaRPr lang="en-IN" dirty="0"/>
+                    </a:p>
+                  </a:txBody>
+                  <a:tcPr/>
+                </a:tc>
+                <a:tc>
+                  <a:txBody>
+                    <a:bodyPr/>
+                    <a:lstStyle/>
+                    <a:p>
+                      <a:endParaRPr lang="en-IN"/>
+                    </a:p>
+                  </a:txBody>
+                  <a:tcPr/>
+                </a:tc>
+                <a:tc>
+                  <a:txBody>
+                    <a:bodyPr/>
+                    <a:lstStyle/>
+                    <a:p>
+                      <a:endParaRPr lang="en-IN" dirty="0"/>
+                    </a:p>
+                  </a:txBody>
+                  <a:tcPr/>
+                </a:tc>
+                <a:extLst>
+                  <a:ext uri="{0D108BD9-81ED-4DB2-BD59-A6C34878D82A}">
+                    <a16:rowId xmlns:a16="http://schemas.microsoft.com/office/drawing/2014/main" val="80062034"/>
+                  </a:ext>
+                </a:extLst>
+              </a:tr>
+            </a:tbl>
+          </a:graphicData>
+        </a:graphic>
+      </p:graphicFrame>
+      <p:graphicFrame>
+        <p:nvGraphicFramePr>
+          <p:cNvPr id="5" name="Table 4">
+            <a:extLst>
+              <a:ext uri="{FF2B5EF4-FFF2-40B4-BE49-F238E27FC236}">
+                <a16:creationId xmlns:a16="http://schemas.microsoft.com/office/drawing/2014/main" id="{9887BE27-411B-4C45-9D7F-EEDA3F5BBA10}"/>
+              </a:ext>
+            </a:extLst>
+          </p:cNvPr>
+          <p:cNvGraphicFramePr>
+            <a:graphicFrameLocks/>
+          </p:cNvGraphicFramePr>
+          <p:nvPr>
+            <p:extLst>
+              <p:ext uri="{D42A27DB-BD31-4B8C-83A1-F6EECF244321}">
+                <p14:modId xmlns:p14="http://schemas.microsoft.com/office/powerpoint/2010/main" val="2364281425"/>
+              </p:ext>
+            </p:extLst>
+          </p:nvPr>
+        </p:nvGraphicFramePr>
+        <p:xfrm>
+          <a:off x="838200" y="3363596"/>
+          <a:ext cx="10515600" cy="1112520"/>
+        </p:xfrm>
+        <a:graphic>
+          <a:graphicData uri="http://schemas.openxmlformats.org/drawingml/2006/table">
+            <a:tbl>
+              <a:tblPr firstRow="1" bandRow="1">
+                <a:tableStyleId>{5C22544A-7EE6-4342-B048-85BDC9FD1C3A}</a:tableStyleId>
+              </a:tblPr>
+              <a:tblGrid>
+                <a:gridCol w="2103120">
+                  <a:extLst>
+                    <a:ext uri="{9D8B030D-6E8A-4147-A177-3AD203B41FA5}">
+                      <a16:colId xmlns:a16="http://schemas.microsoft.com/office/drawing/2014/main" val="1277939613"/>
+                    </a:ext>
+                  </a:extLst>
+                </a:gridCol>
+                <a:gridCol w="2103120">
+                  <a:extLst>
+                    <a:ext uri="{9D8B030D-6E8A-4147-A177-3AD203B41FA5}">
+                      <a16:colId xmlns:a16="http://schemas.microsoft.com/office/drawing/2014/main" val="4154575395"/>
+                    </a:ext>
+                  </a:extLst>
+                </a:gridCol>
+                <a:gridCol w="2103120">
+                  <a:extLst>
+                    <a:ext uri="{9D8B030D-6E8A-4147-A177-3AD203B41FA5}">
+                      <a16:colId xmlns:a16="http://schemas.microsoft.com/office/drawing/2014/main" val="333647600"/>
+                    </a:ext>
+                  </a:extLst>
+                </a:gridCol>
+                <a:gridCol w="2103120">
+                  <a:extLst>
+                    <a:ext uri="{9D8B030D-6E8A-4147-A177-3AD203B41FA5}">
+                      <a16:colId xmlns:a16="http://schemas.microsoft.com/office/drawing/2014/main" val="826640890"/>
+                    </a:ext>
+                  </a:extLst>
+                </a:gridCol>
+                <a:gridCol w="2103120">
+                  <a:extLst>
+                    <a:ext uri="{9D8B030D-6E8A-4147-A177-3AD203B41FA5}">
+                      <a16:colId xmlns:a16="http://schemas.microsoft.com/office/drawing/2014/main" val="1070321062"/>
+                    </a:ext>
+                  </a:extLst>
+                </a:gridCol>
+              </a:tblGrid>
+              <a:tr h="370840">
+                <a:tc>
+                  <a:txBody>
+                    <a:bodyPr/>
+                    <a:lstStyle/>
+                    <a:p>
+                      <a:r>
+                        <a:rPr lang="en-US" dirty="0"/>
+                        <a:t>Customer Number</a:t>
+                      </a:r>
+                      <a:endParaRPr lang="en-IN" dirty="0"/>
+                    </a:p>
+                  </a:txBody>
+                  <a:tcPr/>
+                </a:tc>
+                <a:tc>
+                  <a:txBody>
+                    <a:bodyPr/>
+                    <a:lstStyle/>
+                    <a:p>
+                      <a:r>
+                        <a:rPr lang="en-US" dirty="0"/>
+                        <a:t>Customer Name</a:t>
+                      </a:r>
+                      <a:endParaRPr lang="en-IN" dirty="0"/>
+                    </a:p>
+                  </a:txBody>
+                  <a:tcPr/>
+                </a:tc>
+                <a:tc>
+                  <a:txBody>
+                    <a:bodyPr/>
+                    <a:lstStyle/>
+                    <a:p>
+                      <a:r>
+                        <a:rPr lang="en-US" dirty="0"/>
+                        <a:t>Address Details</a:t>
+                      </a:r>
+                      <a:endParaRPr lang="en-IN" dirty="0"/>
+                    </a:p>
+                  </a:txBody>
+                  <a:tcPr/>
+                </a:tc>
+                <a:tc>
+                  <a:txBody>
+                    <a:bodyPr/>
+                    <a:lstStyle/>
+                    <a:p>
+                      <a:r>
+                        <a:rPr lang="en-US" dirty="0"/>
+                        <a:t>Phone Number</a:t>
+                      </a:r>
+                      <a:endParaRPr lang="en-IN" dirty="0"/>
+                    </a:p>
+                  </a:txBody>
+                  <a:tcPr/>
+                </a:tc>
+                <a:tc>
+                  <a:txBody>
+                    <a:bodyPr/>
+                    <a:lstStyle/>
+                    <a:p>
+                      <a:r>
+                        <a:rPr lang="en-US" dirty="0"/>
+                        <a:t>Changed Date</a:t>
+                      </a:r>
+                      <a:endParaRPr lang="en-IN" dirty="0"/>
+                    </a:p>
+                  </a:txBody>
+                  <a:tcPr/>
+                </a:tc>
+                <a:extLst>
+                  <a:ext uri="{0D108BD9-81ED-4DB2-BD59-A6C34878D82A}">
+                    <a16:rowId xmlns:a16="http://schemas.microsoft.com/office/drawing/2014/main" val="3839619964"/>
+                  </a:ext>
+                </a:extLst>
+              </a:tr>
+              <a:tr h="370840">
+                <a:tc>
+                  <a:txBody>
+                    <a:bodyPr/>
+                    <a:lstStyle/>
+                    <a:p>
+                      <a:endParaRPr lang="en-IN"/>
+                    </a:p>
+                  </a:txBody>
+                  <a:tcPr/>
+                </a:tc>
+                <a:tc>
+                  <a:txBody>
+                    <a:bodyPr/>
+                    <a:lstStyle/>
+                    <a:p>
+                      <a:endParaRPr lang="en-IN"/>
+                    </a:p>
+                  </a:txBody>
+                  <a:tcPr/>
+                </a:tc>
+                <a:tc>
+                  <a:txBody>
+                    <a:bodyPr/>
+                    <a:lstStyle/>
+                    <a:p>
+                      <a:endParaRPr lang="en-IN"/>
+                    </a:p>
+                  </a:txBody>
+                  <a:tcPr/>
+                </a:tc>
+                <a:tc>
+                  <a:txBody>
+                    <a:bodyPr/>
+                    <a:lstStyle/>
+                    <a:p>
+                      <a:endParaRPr lang="en-IN"/>
+                    </a:p>
+                  </a:txBody>
+                  <a:tcPr/>
+                </a:tc>
+                <a:tc>
+                  <a:txBody>
+                    <a:bodyPr/>
+                    <a:lstStyle/>
+                    <a:p>
+                      <a:endParaRPr lang="en-IN"/>
+                    </a:p>
+                  </a:txBody>
+                  <a:tcPr/>
+                </a:tc>
+                <a:extLst>
+                  <a:ext uri="{0D108BD9-81ED-4DB2-BD59-A6C34878D82A}">
+                    <a16:rowId xmlns:a16="http://schemas.microsoft.com/office/drawing/2014/main" val="167107663"/>
+                  </a:ext>
+                </a:extLst>
+              </a:tr>
+              <a:tr h="370840">
+                <a:tc>
+                  <a:txBody>
+                    <a:bodyPr/>
+                    <a:lstStyle/>
+                    <a:p>
+                      <a:endParaRPr lang="en-IN"/>
+                    </a:p>
+                  </a:txBody>
+                  <a:tcPr/>
+                </a:tc>
+                <a:tc>
+                  <a:txBody>
+                    <a:bodyPr/>
+                    <a:lstStyle/>
+                    <a:p>
+                      <a:endParaRPr lang="en-IN"/>
+                    </a:p>
+                  </a:txBody>
+                  <a:tcPr/>
+                </a:tc>
+                <a:tc>
+                  <a:txBody>
+                    <a:bodyPr/>
+                    <a:lstStyle/>
+                    <a:p>
+                      <a:endParaRPr lang="en-IN"/>
+                    </a:p>
+                  </a:txBody>
+                  <a:tcPr/>
+                </a:tc>
+                <a:tc>
+                  <a:txBody>
+                    <a:bodyPr/>
+                    <a:lstStyle/>
+                    <a:p>
+                      <a:endParaRPr lang="en-IN"/>
+                    </a:p>
+                  </a:txBody>
+                  <a:tcPr/>
+                </a:tc>
+                <a:tc>
+                  <a:txBody>
+                    <a:bodyPr/>
+                    <a:lstStyle/>
+                    <a:p>
+                      <a:endParaRPr lang="en-IN" dirty="0"/>
+                    </a:p>
+                  </a:txBody>
+                  <a:tcPr/>
+                </a:tc>
+                <a:extLst>
+                  <a:ext uri="{0D108BD9-81ED-4DB2-BD59-A6C34878D82A}">
+                    <a16:rowId xmlns:a16="http://schemas.microsoft.com/office/drawing/2014/main" val="80062034"/>
+                  </a:ext>
+                </a:extLst>
+              </a:tr>
+            </a:tbl>
+          </a:graphicData>
+        </a:graphic>
+      </p:graphicFrame>
+      <p:graphicFrame>
+        <p:nvGraphicFramePr>
+          <p:cNvPr id="6" name="Table 5">
+            <a:extLst>
+              <a:ext uri="{FF2B5EF4-FFF2-40B4-BE49-F238E27FC236}">
+                <a16:creationId xmlns:a16="http://schemas.microsoft.com/office/drawing/2014/main" id="{27F849A3-40D6-4F78-A293-08A2BCE52AF3}"/>
+              </a:ext>
+            </a:extLst>
+          </p:cNvPr>
+          <p:cNvGraphicFramePr>
+            <a:graphicFrameLocks/>
+          </p:cNvGraphicFramePr>
+          <p:nvPr>
+            <p:extLst>
+              <p:ext uri="{D42A27DB-BD31-4B8C-83A1-F6EECF244321}">
+                <p14:modId xmlns:p14="http://schemas.microsoft.com/office/powerpoint/2010/main" val="2989705514"/>
+              </p:ext>
+            </p:extLst>
+          </p:nvPr>
+        </p:nvGraphicFramePr>
+        <p:xfrm>
+          <a:off x="838200" y="4971933"/>
+          <a:ext cx="10515600" cy="1112520"/>
+        </p:xfrm>
+        <a:graphic>
+          <a:graphicData uri="http://schemas.openxmlformats.org/drawingml/2006/table">
+            <a:tbl>
+              <a:tblPr firstRow="1" bandRow="1">
+                <a:tableStyleId>{5C22544A-7EE6-4342-B048-85BDC9FD1C3A}</a:tableStyleId>
+              </a:tblPr>
+              <a:tblGrid>
+                <a:gridCol w="2103120">
+                  <a:extLst>
+                    <a:ext uri="{9D8B030D-6E8A-4147-A177-3AD203B41FA5}">
+                      <a16:colId xmlns:a16="http://schemas.microsoft.com/office/drawing/2014/main" val="1277939613"/>
+                    </a:ext>
+                  </a:extLst>
+                </a:gridCol>
+                <a:gridCol w="2103120">
+                  <a:extLst>
+                    <a:ext uri="{9D8B030D-6E8A-4147-A177-3AD203B41FA5}">
+                      <a16:colId xmlns:a16="http://schemas.microsoft.com/office/drawing/2014/main" val="4154575395"/>
+                    </a:ext>
+                  </a:extLst>
+                </a:gridCol>
+                <a:gridCol w="2103120">
+                  <a:extLst>
+                    <a:ext uri="{9D8B030D-6E8A-4147-A177-3AD203B41FA5}">
+                      <a16:colId xmlns:a16="http://schemas.microsoft.com/office/drawing/2014/main" val="333647600"/>
+                    </a:ext>
+                  </a:extLst>
+                </a:gridCol>
+                <a:gridCol w="2103120">
+                  <a:extLst>
+                    <a:ext uri="{9D8B030D-6E8A-4147-A177-3AD203B41FA5}">
+                      <a16:colId xmlns:a16="http://schemas.microsoft.com/office/drawing/2014/main" val="826640890"/>
+                    </a:ext>
+                  </a:extLst>
+                </a:gridCol>
+                <a:gridCol w="2103120">
+                  <a:extLst>
+                    <a:ext uri="{9D8B030D-6E8A-4147-A177-3AD203B41FA5}">
+                      <a16:colId xmlns:a16="http://schemas.microsoft.com/office/drawing/2014/main" val="1070321062"/>
+                    </a:ext>
+                  </a:extLst>
+                </a:gridCol>
+              </a:tblGrid>
+              <a:tr h="370840">
+                <a:tc>
+                  <a:txBody>
+                    <a:bodyPr/>
+                    <a:lstStyle/>
+                    <a:p>
+                      <a:r>
+                        <a:rPr lang="en-US" dirty="0"/>
+                        <a:t>Customer Number</a:t>
+                      </a:r>
+                      <a:endParaRPr lang="en-IN" dirty="0"/>
+                    </a:p>
+                  </a:txBody>
+                  <a:tcPr/>
+                </a:tc>
+                <a:tc>
+                  <a:txBody>
+                    <a:bodyPr/>
+                    <a:lstStyle/>
+                    <a:p>
+                      <a:pPr marL="0" marR="0" lvl="0" indent="0" algn="l" defTabSz="914400" rtl="0" eaLnBrk="1" fontAlgn="auto" latinLnBrk="0" hangingPunct="1">
+                        <a:lnSpc>
+                          <a:spcPct val="100000"/>
+                        </a:lnSpc>
+                        <a:spcBef>
+                          <a:spcPts val="0"/>
+                        </a:spcBef>
+                        <a:spcAft>
+                          <a:spcPts val="0"/>
+                        </a:spcAft>
+                        <a:buClrTx/>
+                        <a:buSzTx/>
+                        <a:buFontTx/>
+                        <a:buNone/>
+                        <a:tabLst/>
+                        <a:defRPr/>
+                      </a:pPr>
+                      <a:r>
+                        <a:rPr lang="en-US" dirty="0"/>
+                        <a:t>Ride Number</a:t>
+                      </a:r>
+                      <a:endParaRPr lang="en-IN" dirty="0"/>
+                    </a:p>
+                  </a:txBody>
+                  <a:tcPr/>
+                </a:tc>
+                <a:tc>
+                  <a:txBody>
+                    <a:bodyPr/>
+                    <a:lstStyle/>
+                    <a:p>
+                      <a:r>
+                        <a:rPr lang="en-US" dirty="0"/>
+                        <a:t>Payment Status</a:t>
+                      </a:r>
+                      <a:endParaRPr lang="en-IN" dirty="0"/>
+                    </a:p>
+                  </a:txBody>
+                  <a:tcPr/>
+                </a:tc>
+                <a:tc>
+                  <a:txBody>
+                    <a:bodyPr/>
+                    <a:lstStyle/>
+                    <a:p>
+                      <a:r>
+                        <a:rPr lang="en-US" dirty="0"/>
+                        <a:t>Payment Method</a:t>
+                      </a:r>
+                      <a:endParaRPr lang="en-IN" dirty="0"/>
+                    </a:p>
+                  </a:txBody>
+                  <a:tcPr/>
+                </a:tc>
+                <a:tc>
+                  <a:txBody>
+                    <a:bodyPr/>
+                    <a:lstStyle/>
+                    <a:p>
+                      <a:r>
+                        <a:rPr lang="en-US" dirty="0"/>
+                        <a:t>Changed Date</a:t>
+                      </a:r>
+                      <a:endParaRPr lang="en-IN" dirty="0"/>
+                    </a:p>
+                  </a:txBody>
+                  <a:tcPr/>
+                </a:tc>
+                <a:extLst>
+                  <a:ext uri="{0D108BD9-81ED-4DB2-BD59-A6C34878D82A}">
+                    <a16:rowId xmlns:a16="http://schemas.microsoft.com/office/drawing/2014/main" val="3839619964"/>
+                  </a:ext>
+                </a:extLst>
+              </a:tr>
+              <a:tr h="370840">
+                <a:tc>
+                  <a:txBody>
+                    <a:bodyPr/>
+                    <a:lstStyle/>
+                    <a:p>
+                      <a:endParaRPr lang="en-IN"/>
+                    </a:p>
+                  </a:txBody>
+                  <a:tcPr/>
+                </a:tc>
+                <a:tc>
+                  <a:txBody>
+                    <a:bodyPr/>
+                    <a:lstStyle/>
+                    <a:p>
+                      <a:endParaRPr lang="en-IN"/>
+                    </a:p>
+                  </a:txBody>
+                  <a:tcPr/>
+                </a:tc>
+                <a:tc>
+                  <a:txBody>
+                    <a:bodyPr/>
+                    <a:lstStyle/>
+                    <a:p>
+                      <a:endParaRPr lang="en-IN"/>
+                    </a:p>
+                  </a:txBody>
+                  <a:tcPr/>
+                </a:tc>
+                <a:tc>
+                  <a:txBody>
+                    <a:bodyPr/>
+                    <a:lstStyle/>
+                    <a:p>
+                      <a:endParaRPr lang="en-IN"/>
+                    </a:p>
+                  </a:txBody>
+                  <a:tcPr/>
+                </a:tc>
+                <a:tc>
+                  <a:txBody>
+                    <a:bodyPr/>
+                    <a:lstStyle/>
+                    <a:p>
+                      <a:endParaRPr lang="en-IN"/>
+                    </a:p>
+                  </a:txBody>
+                  <a:tcPr/>
+                </a:tc>
+                <a:extLst>
+                  <a:ext uri="{0D108BD9-81ED-4DB2-BD59-A6C34878D82A}">
+                    <a16:rowId xmlns:a16="http://schemas.microsoft.com/office/drawing/2014/main" val="167107663"/>
+                  </a:ext>
+                </a:extLst>
+              </a:tr>
+              <a:tr h="370840">
+                <a:tc>
+                  <a:txBody>
+                    <a:bodyPr/>
+                    <a:lstStyle/>
+                    <a:p>
+                      <a:endParaRPr lang="en-IN"/>
+                    </a:p>
+                  </a:txBody>
+                  <a:tcPr/>
+                </a:tc>
+                <a:tc>
+                  <a:txBody>
+                    <a:bodyPr/>
+                    <a:lstStyle/>
+                    <a:p>
+                      <a:endParaRPr lang="en-IN"/>
+                    </a:p>
+                  </a:txBody>
+                  <a:tcPr/>
+                </a:tc>
+                <a:tc>
+                  <a:txBody>
+                    <a:bodyPr/>
+                    <a:lstStyle/>
+                    <a:p>
+                      <a:endParaRPr lang="en-IN"/>
+                    </a:p>
+                  </a:txBody>
+                  <a:tcPr/>
+                </a:tc>
+                <a:tc>
+                  <a:txBody>
+                    <a:bodyPr/>
+                    <a:lstStyle/>
+                    <a:p>
+                      <a:endParaRPr lang="en-IN"/>
+                    </a:p>
+                  </a:txBody>
+                  <a:tcPr/>
+                </a:tc>
+                <a:tc>
+                  <a:txBody>
+                    <a:bodyPr/>
+                    <a:lstStyle/>
+                    <a:p>
+                      <a:endParaRPr lang="en-IN" dirty="0"/>
+                    </a:p>
+                  </a:txBody>
+                  <a:tcPr/>
+                </a:tc>
+                <a:extLst>
+                  <a:ext uri="{0D108BD9-81ED-4DB2-BD59-A6C34878D82A}">
+                    <a16:rowId xmlns:a16="http://schemas.microsoft.com/office/drawing/2014/main" val="80062034"/>
+                  </a:ext>
+                </a:extLst>
+              </a:tr>
+            </a:tbl>
+          </a:graphicData>
+        </a:graphic>
+      </p:graphicFrame>
+    </p:spTree>
+    <p:extLst>
+      <p:ext uri="{BB962C8B-B14F-4D97-AF65-F5344CB8AC3E}">
+        <p14:creationId xmlns:p14="http://schemas.microsoft.com/office/powerpoint/2010/main" val="321114298"/>
       </p:ext>
     </p:extLst>
   </p:cSld>

</xml_diff>